<commit_message>
Update slide and demo
</commit_message>
<xml_diff>
--- a/Unit Testing.pptx
+++ b/Unit Testing.pptx
@@ -5514,7 +5514,7 @@
                 </a:solidFill>
                 <a:latin typeface="Montserrat" panose="00000500000000000000" pitchFamily="50" charset="0"/>
               </a:rPr>
-              <a:t>VueX</a:t>
+              <a:t>Vuex</a:t>
             </a:r>
             <a:r>
               <a:rPr lang="en-US" sz="1800" dirty="0">
@@ -5894,64 +5894,6 @@
       </p:sp>
       <p:pic>
         <p:nvPicPr>
-          <p:cNvPr id="9" name="Picture 8">
-            <a:extLst>
-              <a:ext uri="{FF2B5EF4-FFF2-40B4-BE49-F238E27FC236}">
-                <a16:creationId xmlns:a16="http://schemas.microsoft.com/office/drawing/2014/main" id="{7A5D15A4-B0F4-40BA-BBE9-A2DCFD09EB78}"/>
-              </a:ext>
-            </a:extLst>
-          </p:cNvPr>
-          <p:cNvPicPr>
-            <a:picLocks noChangeAspect="1"/>
-          </p:cNvPicPr>
-          <p:nvPr/>
-        </p:nvPicPr>
-        <p:blipFill rotWithShape="1">
-          <a:blip r:embed="rId2"/>
-          <a:srcRect t="16549" b="18166"/>
-          <a:stretch/>
-        </p:blipFill>
-        <p:spPr>
-          <a:xfrm>
-            <a:off x="1191740" y="1149017"/>
-            <a:ext cx="4328971" cy="2026701"/>
-          </a:xfrm>
-          <a:prstGeom prst="rect">
-            <a:avLst/>
-          </a:prstGeom>
-        </p:spPr>
-      </p:pic>
-      <p:pic>
-        <p:nvPicPr>
-          <p:cNvPr id="15" name="Picture 14">
-            <a:extLst>
-              <a:ext uri="{FF2B5EF4-FFF2-40B4-BE49-F238E27FC236}">
-                <a16:creationId xmlns:a16="http://schemas.microsoft.com/office/drawing/2014/main" id="{A63A5A4A-5B3B-4BF6-8D78-EE81996A1C84}"/>
-              </a:ext>
-            </a:extLst>
-          </p:cNvPr>
-          <p:cNvPicPr>
-            <a:picLocks noChangeAspect="1"/>
-          </p:cNvPicPr>
-          <p:nvPr/>
-        </p:nvPicPr>
-        <p:blipFill rotWithShape="1">
-          <a:blip r:embed="rId3"/>
-          <a:srcRect t="16937" b="16248"/>
-          <a:stretch/>
-        </p:blipFill>
-        <p:spPr>
-          <a:xfrm>
-            <a:off x="6275225" y="1139714"/>
-            <a:ext cx="4240338" cy="2082295"/>
-          </a:xfrm>
-          <a:prstGeom prst="rect">
-            <a:avLst/>
-          </a:prstGeom>
-        </p:spPr>
-      </p:pic>
-      <p:pic>
-        <p:nvPicPr>
           <p:cNvPr id="1026" name="Picture 2" descr="Check  free icon">
             <a:extLst>
               <a:ext uri="{FF2B5EF4-FFF2-40B4-BE49-F238E27FC236}">
@@ -5965,7 +5907,7 @@
           <p:nvPr/>
         </p:nvPicPr>
         <p:blipFill>
-          <a:blip r:embed="rId4">
+          <a:blip r:embed="rId2">
             <a:extLst>
               <a:ext uri="{28A0092B-C50C-407E-A947-70E740481C1C}">
                 <a14:useLocalDpi xmlns:a14="http://schemas.microsoft.com/office/drawing/2010/main" val="0"/>
@@ -6012,7 +5954,7 @@
           <p:nvPr/>
         </p:nvPicPr>
         <p:blipFill>
-          <a:blip r:embed="rId5">
+          <a:blip r:embed="rId3">
             <a:extLst>
               <a:ext uri="{28A0092B-C50C-407E-A947-70E740481C1C}">
                 <a14:useLocalDpi xmlns:a14="http://schemas.microsoft.com/office/drawing/2010/main" val="0"/>
@@ -6046,10 +5988,68 @@
       </p:pic>
       <p:pic>
         <p:nvPicPr>
-          <p:cNvPr id="19" name="Picture 18">
+          <p:cNvPr id="5" name="Picture 4">
             <a:extLst>
               <a:ext uri="{FF2B5EF4-FFF2-40B4-BE49-F238E27FC236}">
-                <a16:creationId xmlns:a16="http://schemas.microsoft.com/office/drawing/2014/main" id="{8B7C0D06-6379-436B-BD77-C282F73E1780}"/>
+                <a16:creationId xmlns:a16="http://schemas.microsoft.com/office/drawing/2014/main" id="{69C5E790-9042-4E7A-BB5D-6F64A277C725}"/>
+              </a:ext>
+            </a:extLst>
+          </p:cNvPr>
+          <p:cNvPicPr>
+            <a:picLocks noChangeAspect="1"/>
+          </p:cNvPicPr>
+          <p:nvPr/>
+        </p:nvPicPr>
+        <p:blipFill rotWithShape="1">
+          <a:blip r:embed="rId4"/>
+          <a:srcRect t="17554" b="17390"/>
+          <a:stretch/>
+        </p:blipFill>
+        <p:spPr>
+          <a:xfrm>
+            <a:off x="1241184" y="1135884"/>
+            <a:ext cx="4201519" cy="1978626"/>
+          </a:xfrm>
+          <a:prstGeom prst="rect">
+            <a:avLst/>
+          </a:prstGeom>
+        </p:spPr>
+      </p:pic>
+      <p:pic>
+        <p:nvPicPr>
+          <p:cNvPr id="7" name="Picture 6">
+            <a:extLst>
+              <a:ext uri="{FF2B5EF4-FFF2-40B4-BE49-F238E27FC236}">
+                <a16:creationId xmlns:a16="http://schemas.microsoft.com/office/drawing/2014/main" id="{7CD491CB-0653-4D0B-B089-29551637DA80}"/>
+              </a:ext>
+            </a:extLst>
+          </p:cNvPr>
+          <p:cNvPicPr>
+            <a:picLocks noChangeAspect="1"/>
+          </p:cNvPicPr>
+          <p:nvPr/>
+        </p:nvPicPr>
+        <p:blipFill rotWithShape="1">
+          <a:blip r:embed="rId5"/>
+          <a:srcRect t="18319" b="18335"/>
+          <a:stretch/>
+        </p:blipFill>
+        <p:spPr>
+          <a:xfrm>
+            <a:off x="6323415" y="1187917"/>
+            <a:ext cx="4201519" cy="1926593"/>
+          </a:xfrm>
+          <a:prstGeom prst="rect">
+            <a:avLst/>
+          </a:prstGeom>
+        </p:spPr>
+      </p:pic>
+      <p:pic>
+        <p:nvPicPr>
+          <p:cNvPr id="13" name="Picture 12">
+            <a:extLst>
+              <a:ext uri="{FF2B5EF4-FFF2-40B4-BE49-F238E27FC236}">
+                <a16:creationId xmlns:a16="http://schemas.microsoft.com/office/drawing/2014/main" id="{12F37F1C-AF8C-4066-8841-E3A5B2CB40C7}"/>
               </a:ext>
             </a:extLst>
           </p:cNvPr>
@@ -6066,8 +6066,8 @@
         </p:blipFill>
         <p:spPr>
           <a:xfrm>
-            <a:off x="6490411" y="3188167"/>
-            <a:ext cx="4343590" cy="2799784"/>
+            <a:off x="1423153" y="3429000"/>
+            <a:ext cx="3826180" cy="2021891"/>
           </a:xfrm>
           <a:prstGeom prst="rect">
             <a:avLst/>
@@ -6076,10 +6076,10 @@
       </p:pic>
       <p:pic>
         <p:nvPicPr>
-          <p:cNvPr id="23" name="Picture 22">
+          <p:cNvPr id="21" name="Picture 20">
             <a:extLst>
               <a:ext uri="{FF2B5EF4-FFF2-40B4-BE49-F238E27FC236}">
-                <a16:creationId xmlns:a16="http://schemas.microsoft.com/office/drawing/2014/main" id="{9FFC8AD4-9371-4E6E-885E-15C2591D9B1A}"/>
+                <a16:creationId xmlns:a16="http://schemas.microsoft.com/office/drawing/2014/main" id="{CCB10376-1596-4BD3-9F99-5729E2D2DAF5}"/>
               </a:ext>
             </a:extLst>
           </p:cNvPr>
@@ -6096,8 +6096,8 @@
         </p:blipFill>
         <p:spPr>
           <a:xfrm>
-            <a:off x="1472883" y="3222009"/>
-            <a:ext cx="3766684" cy="1963295"/>
+            <a:off x="6557701" y="3429000"/>
+            <a:ext cx="3763653" cy="2489228"/>
           </a:xfrm>
           <a:prstGeom prst="rect">
             <a:avLst/>
@@ -6249,7 +6249,7 @@
               <a:rPr lang="en-US" sz="2000" dirty="0">
                 <a:latin typeface="Montserrat" panose="00000500000000000000" pitchFamily="50" charset="0"/>
               </a:rPr>
-              <a:t>7. Mocking global objects – Bilingual.spec.js</a:t>
+              <a:t>7. Mocking global objects – FormSubmitter.spec.js</a:t>
             </a:r>
           </a:p>
           <a:p>
@@ -6281,13 +6281,13 @@
               <a:rPr lang="en-US" sz="2000" dirty="0" err="1">
                 <a:latin typeface="Montserrat" panose="00000500000000000000" pitchFamily="50" charset="0"/>
               </a:rPr>
-              <a:t>VueX</a:t>
+              <a:t>Vuex</a:t>
             </a:r>
             <a:r>
               <a:rPr lang="en-US" sz="2000" dirty="0">
                 <a:latin typeface="Montserrat" panose="00000500000000000000" pitchFamily="50" charset="0"/>
               </a:rPr>
-              <a:t> – Explore it yourself</a:t>
+              <a:t> – Feel free to explore yourself</a:t>
             </a:r>
           </a:p>
         </p:txBody>

</xml_diff>